<commit_message>
Added a new document. Update document.
</commit_message>
<xml_diff>
--- a/ppt/codegendev-selfintro-Title.pptx
+++ b/ppt/codegendev-selfintro-Title.pptx
@@ -6430,7 +6430,21 @@
           <a:p>
             <a:r>
               <a:rPr lang="ja-JP" altLang="en-US" sz="3200" dirty="0" smtClean="0"/>
-              <a:t>二次会は？</a:t>
+              <a:t>発表順に希望がある方は表明を</a:t>
+            </a:r>
+            <a:endParaRPr lang="en-US" altLang="ja-JP" sz="3200" dirty="0" smtClean="0"/>
+          </a:p>
+          <a:p>
+            <a:endParaRPr lang="en-US" altLang="ja-JP" sz="3200" dirty="0" smtClean="0"/>
+          </a:p>
+          <a:p>
+            <a:r>
+              <a:rPr lang="ja-JP" altLang="en-US" sz="3200" dirty="0" smtClean="0"/>
+              <a:t>二次会</a:t>
+            </a:r>
+            <a:r>
+              <a:rPr lang="ja-JP" altLang="en-US" sz="3200" dirty="0" smtClean="0"/>
+              <a:t>は？</a:t>
             </a:r>
             <a:endParaRPr lang="en-US" altLang="ja-JP" sz="3200" dirty="0" smtClean="0"/>
           </a:p>
@@ -6442,11 +6456,7 @@
             </a:r>
             <a:r>
               <a:rPr lang="ja-JP" altLang="en-US" sz="3000" dirty="0" smtClean="0"/>
-              <a:t>のほうでは企画して</a:t>
-            </a:r>
-            <a:r>
-              <a:rPr lang="ja-JP" altLang="en-US" sz="3000" dirty="0" smtClean="0"/>
-              <a:t>いません</a:t>
+              <a:t>のほうでは企画していません</a:t>
             </a:r>
             <a:endParaRPr lang="en-US" altLang="ja-JP" sz="3000" dirty="0" smtClean="0"/>
           </a:p>
@@ -6460,7 +6470,6 @@
               <a:rPr lang="en-US" altLang="ja-JP" sz="3000" dirty="0" smtClean="0"/>
               <a:t>…</a:t>
             </a:r>
-            <a:endParaRPr lang="en-US" altLang="ja-JP" sz="3000" dirty="0" smtClean="0"/>
           </a:p>
           <a:p>
             <a:r>
@@ -6473,11 +6482,7 @@
             <a:pPr lvl="1"/>
             <a:r>
               <a:rPr lang="ja-JP" altLang="en-US" sz="3000" dirty="0" smtClean="0"/>
-              <a:t>ネット空間で</a:t>
-            </a:r>
-            <a:r>
-              <a:rPr lang="ja-JP" altLang="en-US" sz="3000" dirty="0" smtClean="0"/>
-              <a:t>秘密な方は自己表明を</a:t>
+              <a:t>ネット空間で秘密な方は自己表明を</a:t>
             </a:r>
             <a:endParaRPr lang="en-US" altLang="ja-JP" sz="3000" dirty="0" smtClean="0"/>
           </a:p>

</xml_diff>